<commit_message>
Docker Cleanup and Installation Steps updated
</commit_message>
<xml_diff>
--- a/Day4/DockerAndKubernetes_Training-Day4.pptx
+++ b/Day4/DockerAndKubernetes_Training-Day4.pptx
@@ -211,7 +211,7 @@
           <a:p>
             <a:fld id="{B09F413D-6E72-4B8A-80ED-A580F7C91B71}" type="datetimeFigureOut">
               <a:rPr lang="en-IN" smtClean="0"/>
-              <a:t>07-04-2023</a:t>
+              <a:t>12-04-2023</a:t>
             </a:fld>
             <a:endParaRPr lang="en-IN"/>
           </a:p>
@@ -1101,7 +1101,7 @@
           <a:p>
             <a:fld id="{12E8600E-B0EE-4521-BF40-4B72FBA06775}" type="datetimeFigureOut">
               <a:rPr lang="en-IN" smtClean="0"/>
-              <a:t>07-04-2023</a:t>
+              <a:t>12-04-2023</a:t>
             </a:fld>
             <a:endParaRPr lang="en-IN"/>
           </a:p>
@@ -2190,7 +2190,7 @@
             <a:fld id="{49F3E739-D457-46E5-B626-C9B182A007EE}" type="datetimeFigureOut">
               <a:rPr lang="en-US" smtClean="0"/>
               <a:pPr/>
-              <a:t>4/7/2023</a:t>
+              <a:t>4/12/2023</a:t>
             </a:fld>
             <a:endParaRPr lang="en-US"/>
           </a:p>
@@ -3172,7 +3172,7 @@
             <a:fld id="{49F3E739-D457-46E5-B626-C9B182A007EE}" type="datetimeFigureOut">
               <a:rPr lang="en-US" smtClean="0"/>
               <a:pPr/>
-              <a:t>4/7/2023</a:t>
+              <a:t>4/12/2023</a:t>
             </a:fld>
             <a:endParaRPr lang="en-US"/>
           </a:p>
@@ -4308,7 +4308,7 @@
             <a:fld id="{49F3E739-D457-46E5-B626-C9B182A007EE}" type="datetimeFigureOut">
               <a:rPr lang="en-US" smtClean="0"/>
               <a:pPr/>
-              <a:t>4/7/2023</a:t>
+              <a:t>4/12/2023</a:t>
             </a:fld>
             <a:endParaRPr lang="en-US"/>
           </a:p>
@@ -5343,7 +5343,7 @@
             <a:fld id="{49F3E739-D457-46E5-B626-C9B182A007EE}" type="datetimeFigureOut">
               <a:rPr lang="en-US" smtClean="0"/>
               <a:pPr/>
-              <a:t>4/7/2023</a:t>
+              <a:t>4/12/2023</a:t>
             </a:fld>
             <a:endParaRPr lang="en-US"/>
           </a:p>
@@ -6005,7 +6005,7 @@
             <a:fld id="{49F3E739-D457-46E5-B626-C9B182A007EE}" type="datetimeFigureOut">
               <a:rPr lang="en-US" smtClean="0"/>
               <a:pPr/>
-              <a:t>4/7/2023</a:t>
+              <a:t>4/12/2023</a:t>
             </a:fld>
             <a:endParaRPr lang="en-US"/>
           </a:p>
@@ -6868,7 +6868,7 @@
             <a:fld id="{49F3E739-D457-46E5-B626-C9B182A007EE}" type="datetimeFigureOut">
               <a:rPr lang="en-US" smtClean="0"/>
               <a:pPr/>
-              <a:t>4/7/2023</a:t>
+              <a:t>4/12/2023</a:t>
             </a:fld>
             <a:endParaRPr lang="en-US"/>
           </a:p>
@@ -7059,7 +7059,7 @@
           <a:p>
             <a:fld id="{12E8600E-B0EE-4521-BF40-4B72FBA06775}" type="datetimeFigureOut">
               <a:rPr lang="en-IN" smtClean="0"/>
-              <a:t>07-04-2023</a:t>
+              <a:t>12-04-2023</a:t>
             </a:fld>
             <a:endParaRPr lang="en-IN"/>
           </a:p>
@@ -8031,7 +8031,7 @@
           <a:p>
             <a:fld id="{12E8600E-B0EE-4521-BF40-4B72FBA06775}" type="datetimeFigureOut">
               <a:rPr lang="en-IN" smtClean="0"/>
-              <a:t>07-04-2023</a:t>
+              <a:t>12-04-2023</a:t>
             </a:fld>
             <a:endParaRPr lang="en-IN"/>
           </a:p>
@@ -8242,7 +8242,7 @@
           <a:p>
             <a:fld id="{12E8600E-B0EE-4521-BF40-4B72FBA06775}" type="datetimeFigureOut">
               <a:rPr lang="en-IN" smtClean="0"/>
-              <a:t>07-04-2023</a:t>
+              <a:t>12-04-2023</a:t>
             </a:fld>
             <a:endParaRPr lang="en-IN"/>
           </a:p>
@@ -9276,7 +9276,7 @@
           <a:p>
             <a:fld id="{12E8600E-B0EE-4521-BF40-4B72FBA06775}" type="datetimeFigureOut">
               <a:rPr lang="en-IN" smtClean="0"/>
-              <a:t>07-04-2023</a:t>
+              <a:t>12-04-2023</a:t>
             </a:fld>
             <a:endParaRPr lang="en-IN"/>
           </a:p>
@@ -9548,7 +9548,7 @@
           <a:p>
             <a:fld id="{12E8600E-B0EE-4521-BF40-4B72FBA06775}" type="datetimeFigureOut">
               <a:rPr lang="en-IN" smtClean="0"/>
-              <a:t>07-04-2023</a:t>
+              <a:t>12-04-2023</a:t>
             </a:fld>
             <a:endParaRPr lang="en-IN"/>
           </a:p>
@@ -9959,7 +9959,7 @@
             <a:fld id="{49F3E739-D457-46E5-B626-C9B182A007EE}" type="datetimeFigureOut">
               <a:rPr lang="en-US" smtClean="0"/>
               <a:pPr/>
-              <a:t>4/7/2023</a:t>
+              <a:t>4/12/2023</a:t>
             </a:fld>
             <a:endParaRPr lang="en-US"/>
           </a:p>
@@ -10087,7 +10087,7 @@
           <a:p>
             <a:fld id="{12E8600E-B0EE-4521-BF40-4B72FBA06775}" type="datetimeFigureOut">
               <a:rPr lang="en-IN" smtClean="0"/>
-              <a:t>07-04-2023</a:t>
+              <a:t>12-04-2023</a:t>
             </a:fld>
             <a:endParaRPr lang="en-IN"/>
           </a:p>
@@ -10182,7 +10182,7 @@
           <a:p>
             <a:fld id="{12E8600E-B0EE-4521-BF40-4B72FBA06775}" type="datetimeFigureOut">
               <a:rPr lang="en-IN" smtClean="0"/>
-              <a:t>07-04-2023</a:t>
+              <a:t>12-04-2023</a:t>
             </a:fld>
             <a:endParaRPr lang="en-IN"/>
           </a:p>
@@ -11263,7 +11263,7 @@
           <a:p>
             <a:fld id="{12E8600E-B0EE-4521-BF40-4B72FBA06775}" type="datetimeFigureOut">
               <a:rPr lang="en-IN" smtClean="0"/>
-              <a:t>07-04-2023</a:t>
+              <a:t>12-04-2023</a:t>
             </a:fld>
             <a:endParaRPr lang="en-IN"/>
           </a:p>
@@ -12372,7 +12372,7 @@
             <a:fld id="{49F3E739-D457-46E5-B626-C9B182A007EE}" type="datetimeFigureOut">
               <a:rPr lang="en-US" smtClean="0"/>
               <a:pPr/>
-              <a:t>4/7/2023</a:t>
+              <a:t>4/12/2023</a:t>
             </a:fld>
             <a:endParaRPr lang="en-US"/>
           </a:p>
@@ -13371,7 +13371,7 @@
             <a:fld id="{49F3E739-D457-46E5-B626-C9B182A007EE}" type="datetimeFigureOut">
               <a:rPr lang="en-US" smtClean="0"/>
               <a:pPr/>
-              <a:t>4/7/2023</a:t>
+              <a:t>4/12/2023</a:t>
             </a:fld>
             <a:endParaRPr lang="en-US"/>
           </a:p>

</xml_diff>